<commit_message>
bai thi nhom 3
Sua loi chinh ta
</commit_message>
<xml_diff>
--- a/BAITHI_NHOM3.pptx
+++ b/BAITHI_NHOM3.pptx
@@ -9562,7 +9562,7 @@
                 <a:ea typeface="Microsoft YaHei"/>
                 <a:cs typeface="Times New Roman"/>
               </a:rPr>
-              <a:t>( contact)</a:t>
+              <a:t> ( contact)</a:t>
             </a:r>
           </a:p>
           <a:p>
@@ -9634,10 +9634,10 @@
                 <a:ea typeface="Microsoft YaHei"/>
                 <a:cs typeface="Times New Roman"/>
               </a:rPr>
-              <a:t> (login/</a:t>
-            </a:r>
-            <a:r>
-              <a:rPr lang="en-US" sz="3200" dirty="0" err="1">
+              <a:t> (login</a:t>
+            </a:r>
+            <a:r>
+              <a:rPr lang="en-US" sz="3200">
                 <a:solidFill>
                   <a:schemeClr val="tx1"/>
                 </a:solidFill>
@@ -9645,19 +9645,16 @@
                 <a:ea typeface="Microsoft YaHei"/>
                 <a:cs typeface="Times New Roman"/>
               </a:rPr>
-              <a:t>prodcut</a:t>
-            </a:r>
-            <a:r>
-              <a:rPr lang="en-US" sz="3200" dirty="0">
-                <a:solidFill>
-                  <a:schemeClr val="tx1"/>
-                </a:solidFill>
-                <a:latin typeface="Times New Roman"/>
-                <a:ea typeface="Microsoft YaHei"/>
-                <a:cs typeface="Times New Roman"/>
-              </a:rPr>
-              <a:t>)</a:t>
-            </a:r>
+              <a:t>/product)</a:t>
+            </a:r>
+            <a:endParaRPr lang="en-US" sz="3200" dirty="0">
+              <a:solidFill>
+                <a:schemeClr val="tx1"/>
+              </a:solidFill>
+              <a:latin typeface="Times New Roman"/>
+              <a:ea typeface="Microsoft YaHei"/>
+              <a:cs typeface="Times New Roman"/>
+            </a:endParaRPr>
           </a:p>
           <a:p>
             <a:pPr marL="571500" indent="-571500">

</xml_diff>